<commit_message>
updated w/ another customer thing
</commit_message>
<xml_diff>
--- a/examples/ecomm_platform/dependencies.pptx
+++ b/examples/ecomm_platform/dependencies.pptx
@@ -106,6 +106,11 @@
       </a:defRPr>
     </a:lvl9pPr>
   </p:defaultTextStyle>
+  <p:extLst>
+    <p:ext uri="{EFAFB233-063F-42B5-8137-9DF3F51BA10A}">
+      <p15:sldGuideLst xmlns:p15="http://schemas.microsoft.com/office/powerpoint/2012/main"/>
+    </p:ext>
+  </p:extLst>
 </p:presentation>
 </file>
 
@@ -256,7 +261,7 @@
           <a:p>
             <a:fld id="{EA3DC024-1F85-4336-AAA3-9B6520D2DB3A}" type="datetimeFigureOut">
               <a:rPr lang="en-US" smtClean="0"/>
-              <a:t>9/25/2024</a:t>
+              <a:t>9/26/2024</a:t>
             </a:fld>
             <a:endParaRPr lang="en-US"/>
           </a:p>
@@ -454,7 +459,7 @@
           <a:p>
             <a:fld id="{EA3DC024-1F85-4336-AAA3-9B6520D2DB3A}" type="datetimeFigureOut">
               <a:rPr lang="en-US" smtClean="0"/>
-              <a:t>9/25/2024</a:t>
+              <a:t>9/26/2024</a:t>
             </a:fld>
             <a:endParaRPr lang="en-US"/>
           </a:p>
@@ -662,7 +667,7 @@
           <a:p>
             <a:fld id="{EA3DC024-1F85-4336-AAA3-9B6520D2DB3A}" type="datetimeFigureOut">
               <a:rPr lang="en-US" smtClean="0"/>
-              <a:t>9/25/2024</a:t>
+              <a:t>9/26/2024</a:t>
             </a:fld>
             <a:endParaRPr lang="en-US"/>
           </a:p>
@@ -860,7 +865,7 @@
           <a:p>
             <a:fld id="{EA3DC024-1F85-4336-AAA3-9B6520D2DB3A}" type="datetimeFigureOut">
               <a:rPr lang="en-US" smtClean="0"/>
-              <a:t>9/25/2024</a:t>
+              <a:t>9/26/2024</a:t>
             </a:fld>
             <a:endParaRPr lang="en-US"/>
           </a:p>
@@ -1135,7 +1140,7 @@
           <a:p>
             <a:fld id="{EA3DC024-1F85-4336-AAA3-9B6520D2DB3A}" type="datetimeFigureOut">
               <a:rPr lang="en-US" smtClean="0"/>
-              <a:t>9/25/2024</a:t>
+              <a:t>9/26/2024</a:t>
             </a:fld>
             <a:endParaRPr lang="en-US"/>
           </a:p>
@@ -1400,7 +1405,7 @@
           <a:p>
             <a:fld id="{EA3DC024-1F85-4336-AAA3-9B6520D2DB3A}" type="datetimeFigureOut">
               <a:rPr lang="en-US" smtClean="0"/>
-              <a:t>9/25/2024</a:t>
+              <a:t>9/26/2024</a:t>
             </a:fld>
             <a:endParaRPr lang="en-US"/>
           </a:p>
@@ -1812,7 +1817,7 @@
           <a:p>
             <a:fld id="{EA3DC024-1F85-4336-AAA3-9B6520D2DB3A}" type="datetimeFigureOut">
               <a:rPr lang="en-US" smtClean="0"/>
-              <a:t>9/25/2024</a:t>
+              <a:t>9/26/2024</a:t>
             </a:fld>
             <a:endParaRPr lang="en-US"/>
           </a:p>
@@ -1953,7 +1958,7 @@
           <a:p>
             <a:fld id="{EA3DC024-1F85-4336-AAA3-9B6520D2DB3A}" type="datetimeFigureOut">
               <a:rPr lang="en-US" smtClean="0"/>
-              <a:t>9/25/2024</a:t>
+              <a:t>9/26/2024</a:t>
             </a:fld>
             <a:endParaRPr lang="en-US"/>
           </a:p>
@@ -2066,7 +2071,7 @@
           <a:p>
             <a:fld id="{EA3DC024-1F85-4336-AAA3-9B6520D2DB3A}" type="datetimeFigureOut">
               <a:rPr lang="en-US" smtClean="0"/>
-              <a:t>9/25/2024</a:t>
+              <a:t>9/26/2024</a:t>
             </a:fld>
             <a:endParaRPr lang="en-US"/>
           </a:p>
@@ -2377,7 +2382,7 @@
           <a:p>
             <a:fld id="{EA3DC024-1F85-4336-AAA3-9B6520D2DB3A}" type="datetimeFigureOut">
               <a:rPr lang="en-US" smtClean="0"/>
-              <a:t>9/25/2024</a:t>
+              <a:t>9/26/2024</a:t>
             </a:fld>
             <a:endParaRPr lang="en-US"/>
           </a:p>
@@ -2665,7 +2670,7 @@
           <a:p>
             <a:fld id="{EA3DC024-1F85-4336-AAA3-9B6520D2DB3A}" type="datetimeFigureOut">
               <a:rPr lang="en-US" smtClean="0"/>
-              <a:t>9/25/2024</a:t>
+              <a:t>9/26/2024</a:t>
             </a:fld>
             <a:endParaRPr lang="en-US"/>
           </a:p>
@@ -2906,7 +2911,7 @@
           <a:p>
             <a:fld id="{EA3DC024-1F85-4336-AAA3-9B6520D2DB3A}" type="datetimeFigureOut">
               <a:rPr lang="en-US" smtClean="0"/>
-              <a:t>9/25/2024</a:t>
+              <a:t>9/26/2024</a:t>
             </a:fld>
             <a:endParaRPr lang="en-US"/>
           </a:p>
@@ -4992,7 +4997,7 @@
         </p:nvSpPr>
         <p:spPr>
           <a:xfrm>
-            <a:off x="3949521" y="1591172"/>
+            <a:off x="3942232" y="1335301"/>
             <a:ext cx="6094476" cy="338554"/>
           </a:xfrm>
           <a:prstGeom prst="rect">
@@ -5018,6 +5023,60 @@
                 <a:latin typeface="Consolas" panose="020B0609020204030204" pitchFamily="49" charset="0"/>
               </a:rPr>
               <a:t>create_order</a:t>
+            </a:r>
+            <a:endParaRPr lang="en-US" sz="1600" b="0" dirty="0">
+              <a:solidFill>
+                <a:srgbClr val="D4D4D4"/>
+              </a:solidFill>
+              <a:effectLst/>
+              <a:highlight>
+                <a:srgbClr val="1E1E1E"/>
+              </a:highlight>
+              <a:latin typeface="Consolas" panose="020B0609020204030204" pitchFamily="49" charset="0"/>
+            </a:endParaRPr>
+          </a:p>
+        </p:txBody>
+      </p:sp>
+      <p:sp>
+        <p:nvSpPr>
+          <p:cNvPr id="2" name="TextBox 1">
+            <a:extLst>
+              <a:ext uri="{FF2B5EF4-FFF2-40B4-BE49-F238E27FC236}">
+                <a16:creationId xmlns:a16="http://schemas.microsoft.com/office/drawing/2014/main" id="{2D5EEE59-A974-B565-5BB2-E4219473B104}"/>
+              </a:ext>
+            </a:extLst>
+          </p:cNvPr>
+          <p:cNvSpPr txBox="1"/>
+          <p:nvPr/>
+        </p:nvSpPr>
+        <p:spPr>
+          <a:xfrm>
+            <a:off x="3949521" y="1610638"/>
+            <a:ext cx="6094476" cy="338554"/>
+          </a:xfrm>
+          <a:prstGeom prst="rect">
+            <a:avLst/>
+          </a:prstGeom>
+          <a:noFill/>
+        </p:spPr>
+        <p:txBody>
+          <a:bodyPr wrap="square">
+            <a:spAutoFit/>
+          </a:bodyPr>
+          <a:lstStyle/>
+          <a:p>
+            <a:r>
+              <a:rPr lang="en-US" sz="1600" b="0" dirty="0" err="1">
+                <a:solidFill>
+                  <a:srgbClr val="D4D4D4"/>
+                </a:solidFill>
+                <a:effectLst/>
+                <a:highlight>
+                  <a:srgbClr val="1E1E1E"/>
+                </a:highlight>
+                <a:latin typeface="Consolas" panose="020B0609020204030204" pitchFamily="49" charset="0"/>
+              </a:rPr>
+              <a:t>get_order</a:t>
             </a:r>
             <a:endParaRPr lang="en-US" sz="1600" b="0" dirty="0">
               <a:solidFill>

</xml_diff>